<commit_message>
Added dependencies for the upcoming 2.3.0 version
</commit_message>
<xml_diff>
--- a/docs/ICT-Transport-Silicone_Java_ProjectDependencies-221.pptx
+++ b/docs/ICT-Transport-Silicone_Java_ProjectDependencies-221.pptx
@@ -195,7 +195,7 @@
             <a:fld id="{088C8A11-EB0A-48FD-92A0-DF3091336A59}" type="datetimeFigureOut">
               <a:rPr lang="en-GB" smtClean="0"/>
               <a:pPr/>
-              <a:t>19/03/2012</a:t>
+              <a:t>29/03/2012</a:t>
             </a:fld>
             <a:endParaRPr lang="en-GB"/>
           </a:p>
@@ -366,7 +366,7 @@
     </p:spTree>
     <p:extLst>
       <p:ext uri="{BB962C8B-B14F-4D97-AF65-F5344CB8AC3E}">
-        <p14:creationId xmlns:p14="http://schemas.microsoft.com/office/powerpoint/2010/main" val="2347062740"/>
+        <p14:creationId xmlns:p14="http://schemas.microsoft.com/office/powerpoint/2010/main" xmlns="" val="2347062740"/>
       </p:ext>
     </p:extLst>
   </p:cSld>
@@ -812,7 +812,7 @@
             <a:fld id="{2943B846-A01C-46EC-8AC6-C34985E1F147}" type="datetime1">
               <a:rPr lang="de-AT" smtClean="0"/>
               <a:pPr/>
-              <a:t>19.03.2012</a:t>
+              <a:t>29.03.2012</a:t>
             </a:fld>
             <a:endParaRPr lang="de-AT"/>
           </a:p>
@@ -979,7 +979,7 @@
             <a:fld id="{64584377-67F1-4445-89AB-0F3B7CC8E5FA}" type="datetime1">
               <a:rPr lang="de-AT" smtClean="0"/>
               <a:pPr/>
-              <a:t>19.03.2012</a:t>
+              <a:t>29.03.2012</a:t>
             </a:fld>
             <a:endParaRPr lang="de-AT"/>
           </a:p>
@@ -1156,7 +1156,7 @@
             <a:fld id="{68516438-451A-4676-91C7-7C955F69BD50}" type="datetime1">
               <a:rPr lang="de-AT" smtClean="0"/>
               <a:pPr/>
-              <a:t>19.03.2012</a:t>
+              <a:t>29.03.2012</a:t>
             </a:fld>
             <a:endParaRPr lang="de-AT"/>
           </a:p>
@@ -1323,7 +1323,7 @@
             <a:fld id="{7C74F28F-B9B7-4CA1-8E74-4FCCB67A3728}" type="datetime1">
               <a:rPr lang="de-AT" smtClean="0"/>
               <a:pPr/>
-              <a:t>19.03.2012</a:t>
+              <a:t>29.03.2012</a:t>
             </a:fld>
             <a:endParaRPr lang="de-AT"/>
           </a:p>
@@ -1566,7 +1566,7 @@
             <a:fld id="{F7B98E26-33EA-476B-A7F4-78BCBDB1F9DF}" type="datetime1">
               <a:rPr lang="de-AT" smtClean="0"/>
               <a:pPr/>
-              <a:t>19.03.2012</a:t>
+              <a:t>29.03.2012</a:t>
             </a:fld>
             <a:endParaRPr lang="de-AT"/>
           </a:p>
@@ -1851,7 +1851,7 @@
             <a:fld id="{17E15FCA-C1C5-4B6F-8E6B-C765FCBCEDE7}" type="datetime1">
               <a:rPr lang="de-AT" smtClean="0"/>
               <a:pPr/>
-              <a:t>19.03.2012</a:t>
+              <a:t>29.03.2012</a:t>
             </a:fld>
             <a:endParaRPr lang="de-AT"/>
           </a:p>
@@ -2270,7 +2270,7 @@
             <a:fld id="{3FC30DF9-67D6-4DCD-952D-517CFD9234A1}" type="datetime1">
               <a:rPr lang="de-AT" smtClean="0"/>
               <a:pPr/>
-              <a:t>19.03.2012</a:t>
+              <a:t>29.03.2012</a:t>
             </a:fld>
             <a:endParaRPr lang="de-AT"/>
           </a:p>
@@ -2385,7 +2385,7 @@
             <a:fld id="{37545D1E-AD59-4781-9575-A1389292FAC4}" type="datetime1">
               <a:rPr lang="de-AT" smtClean="0"/>
               <a:pPr/>
-              <a:t>19.03.2012</a:t>
+              <a:t>29.03.2012</a:t>
             </a:fld>
             <a:endParaRPr lang="de-AT"/>
           </a:p>
@@ -2477,7 +2477,7 @@
             <a:fld id="{44A36951-5496-4E3B-A01F-53A9ACCD758B}" type="datetime1">
               <a:rPr lang="de-AT" smtClean="0"/>
               <a:pPr/>
-              <a:t>19.03.2012</a:t>
+              <a:t>29.03.2012</a:t>
             </a:fld>
             <a:endParaRPr lang="de-AT"/>
           </a:p>
@@ -2751,7 +2751,7 @@
             <a:fld id="{CAC1171A-F559-4EBA-A918-D02527D76FE2}" type="datetime1">
               <a:rPr lang="de-AT" smtClean="0"/>
               <a:pPr/>
-              <a:t>19.03.2012</a:t>
+              <a:t>29.03.2012</a:t>
             </a:fld>
             <a:endParaRPr lang="de-AT"/>
           </a:p>
@@ -3001,7 +3001,7 @@
             <a:fld id="{12C68ADA-1EEA-480A-9CD1-8E41C4EF7AEC}" type="datetime1">
               <a:rPr lang="de-AT" smtClean="0"/>
               <a:pPr/>
-              <a:t>19.03.2012</a:t>
+              <a:t>29.03.2012</a:t>
             </a:fld>
             <a:endParaRPr lang="de-AT"/>
           </a:p>
@@ -3211,7 +3211,7 @@
             <a:fld id="{82FD0C75-38EC-4741-8E42-89A6EA3BCDBC}" type="datetime1">
               <a:rPr lang="de-AT" smtClean="0"/>
               <a:pPr/>
-              <a:t>19.03.2012</a:t>
+              <a:t>29.03.2012</a:t>
             </a:fld>
             <a:endParaRPr lang="de-AT"/>
           </a:p>
@@ -3599,8 +3599,16 @@
           <a:lstStyle/>
           <a:p>
             <a:r>
+              <a:rPr lang="de-AT" dirty="0" smtClean="0"/>
+              <a:t>peppol-</a:t>
+            </a:r>
+            <a:r>
               <a:rPr lang="de-AT" dirty="0" err="1" smtClean="0"/>
-              <a:t>peppol-silicone</a:t>
+              <a:t>silicone</a:t>
+            </a:r>
+            <a:r>
+              <a:rPr lang="de-AT" smtClean="0"/>
+              <a:t> 2.2.1</a:t>
             </a:r>
             <a:r>
               <a:rPr lang="de-AT" dirty="0" smtClean="0"/>
@@ -3681,7 +3689,7 @@
             <a:fld id="{5C3FF81A-864E-415D-AB7A-121B57111D20}" type="datetime1">
               <a:rPr lang="de-AT" smtClean="0"/>
               <a:pPr/>
-              <a:t>19.03.2012</a:t>
+              <a:t>29.03.2012</a:t>
             </a:fld>
             <a:endParaRPr lang="de-AT"/>
           </a:p>

</xml_diff>